<commit_message>
diagram changes and comments
</commit_message>
<xml_diff>
--- a/slides.pptx
+++ b/slides.pptx
@@ -136,7 +136,7 @@
       </p:grpSpPr>
       <p:sp>
         <p:nvSpPr>
-          <p:cNvPr id="205265318" name="Header Placeholder 1"/>
+          <p:cNvPr id="1446912545" name="Header Placeholder 1"/>
           <p:cNvSpPr>
             <a:spLocks noGrp="1"/>
           </p:cNvSpPr>
@@ -170,7 +170,7 @@
       </p:sp>
       <p:sp>
         <p:nvSpPr>
-          <p:cNvPr id="361746884" name="Date Placeholder 2"/>
+          <p:cNvPr id="1325683936" name="Date Placeholder 2"/>
           <p:cNvSpPr>
             <a:spLocks noGrp="1"/>
           </p:cNvSpPr>
@@ -208,7 +208,7 @@
       </p:sp>
       <p:sp>
         <p:nvSpPr>
-          <p:cNvPr id="441411371" name="Slide Image Placeholder 3"/>
+          <p:cNvPr id="97984921" name="Slide Image Placeholder 3"/>
           <p:cNvSpPr>
             <a:spLocks noChangeAspect="1" noGrp="1" noRot="1"/>
           </p:cNvSpPr>
@@ -244,7 +244,7 @@
       </p:sp>
       <p:sp>
         <p:nvSpPr>
-          <p:cNvPr id="339657025" name="Notes Placeholder 4"/>
+          <p:cNvPr id="1313928288" name="Notes Placeholder 4"/>
           <p:cNvSpPr>
             <a:spLocks noGrp="1"/>
           </p:cNvSpPr>
@@ -318,7 +318,7 @@
       </p:sp>
       <p:sp>
         <p:nvSpPr>
-          <p:cNvPr id="1669314836" name="Footer Placeholder 5"/>
+          <p:cNvPr id="1399507097" name="Footer Placeholder 5"/>
           <p:cNvSpPr>
             <a:spLocks noGrp="1"/>
           </p:cNvSpPr>
@@ -352,7 +352,7 @@
       </p:sp>
       <p:sp>
         <p:nvSpPr>
-          <p:cNvPr id="679478538" name="Slide Number Placeholder 6"/>
+          <p:cNvPr id="90174237" name="Slide Number Placeholder 6"/>
           <p:cNvSpPr>
             <a:spLocks noGrp="1"/>
           </p:cNvSpPr>
@@ -505,7 +505,7 @@
       </p:grpSpPr>
       <p:sp>
         <p:nvSpPr>
-          <p:cNvPr id="858249501" name="Slide Image Placeholder 1"/>
+          <p:cNvPr id="1444114044" name="Slide Image Placeholder 1"/>
           <p:cNvSpPr>
             <a:spLocks noChangeAspect="1" noGrp="1" noRot="1"/>
           </p:cNvSpPr>
@@ -522,7 +522,7 @@
       </p:sp>
       <p:sp>
         <p:nvSpPr>
-          <p:cNvPr id="1104103281" name="Notes Placeholder 2"/>
+          <p:cNvPr id="1296366794" name="Notes Placeholder 2"/>
           <p:cNvSpPr>
             <a:spLocks noGrp="1"/>
           </p:cNvSpPr>
@@ -547,7 +547,7 @@
       </p:sp>
       <p:sp>
         <p:nvSpPr>
-          <p:cNvPr id="800037620" name="Slide Number Placeholder 3"/>
+          <p:cNvPr id="458395394" name="Slide Number Placeholder 3"/>
           <p:cNvSpPr>
             <a:spLocks noGrp="1"/>
           </p:cNvSpPr>
@@ -595,7 +595,7 @@
       </p:grpSpPr>
       <p:sp>
         <p:nvSpPr>
-          <p:cNvPr id="756971181" name="Slide Image Placeholder 1"/>
+          <p:cNvPr id="146609025" name="Slide Image Placeholder 1"/>
           <p:cNvSpPr>
             <a:spLocks noChangeAspect="1" noGrp="1" noRot="1"/>
           </p:cNvSpPr>
@@ -607,7 +607,7 @@
       </p:sp>
       <p:sp>
         <p:nvSpPr>
-          <p:cNvPr id="1190868867" name="Notes Placeholder 2"/>
+          <p:cNvPr id="1878616270" name="Notes Placeholder 2"/>
           <p:cNvSpPr>
             <a:spLocks noGrp="1"/>
           </p:cNvSpPr>
@@ -629,7 +629,7 @@
       </p:sp>
       <p:sp>
         <p:nvSpPr>
-          <p:cNvPr id="663737620" name="Slide Number Placeholder 3"/>
+          <p:cNvPr id="411515719" name="Slide Number Placeholder 3"/>
           <p:cNvSpPr>
             <a:spLocks noGrp="1"/>
           </p:cNvSpPr>
@@ -677,7 +677,7 @@
       </p:grpSpPr>
       <p:sp>
         <p:nvSpPr>
-          <p:cNvPr id="307075957" name="Slide Image Placeholder 1"/>
+          <p:cNvPr id="872931590" name="Slide Image Placeholder 1"/>
           <p:cNvSpPr>
             <a:spLocks noChangeAspect="1" noGrp="1" noRot="1"/>
           </p:cNvSpPr>
@@ -689,7 +689,7 @@
       </p:sp>
       <p:sp>
         <p:nvSpPr>
-          <p:cNvPr id="1617016868" name="Notes Placeholder 2"/>
+          <p:cNvPr id="888149024" name="Notes Placeholder 2"/>
           <p:cNvSpPr>
             <a:spLocks noGrp="1"/>
           </p:cNvSpPr>
@@ -711,7 +711,7 @@
       </p:sp>
       <p:sp>
         <p:nvSpPr>
-          <p:cNvPr id="1607791245" name="Slide Number Placeholder 3"/>
+          <p:cNvPr id="520178646" name="Slide Number Placeholder 3"/>
           <p:cNvSpPr>
             <a:spLocks noGrp="1"/>
           </p:cNvSpPr>
@@ -759,7 +759,7 @@
       </p:grpSpPr>
       <p:sp>
         <p:nvSpPr>
-          <p:cNvPr id="837218756" name="Title 1"/>
+          <p:cNvPr id="1517916349" name="Title 1"/>
           <p:cNvSpPr>
             <a:spLocks noGrp="1"/>
           </p:cNvSpPr>
@@ -794,7 +794,7 @@
       </p:sp>
       <p:sp>
         <p:nvSpPr>
-          <p:cNvPr id="155922306" name="Subtitle 2"/>
+          <p:cNvPr id="614190643" name="Subtitle 2"/>
           <p:cNvSpPr>
             <a:spLocks noGrp="1"/>
           </p:cNvSpPr>
@@ -862,7 +862,7 @@
       </p:sp>
       <p:sp>
         <p:nvSpPr>
-          <p:cNvPr id="1999211594" name="Date Placeholder 3"/>
+          <p:cNvPr id="1269721991" name="Date Placeholder 3"/>
           <p:cNvSpPr>
             <a:spLocks noGrp="1"/>
           </p:cNvSpPr>
@@ -888,7 +888,7 @@
       </p:sp>
       <p:sp>
         <p:nvSpPr>
-          <p:cNvPr id="1440577144" name="Footer Placeholder 4"/>
+          <p:cNvPr id="1675416759" name="Footer Placeholder 4"/>
           <p:cNvSpPr>
             <a:spLocks noGrp="1"/>
           </p:cNvSpPr>
@@ -910,7 +910,7 @@
       </p:sp>
       <p:sp>
         <p:nvSpPr>
-          <p:cNvPr id="365490430" name="Slide Number Placeholder 5"/>
+          <p:cNvPr id="651130123" name="Slide Number Placeholder 5"/>
           <p:cNvSpPr>
             <a:spLocks noGrp="1"/>
           </p:cNvSpPr>
@@ -961,7 +961,7 @@
       </p:grpSpPr>
       <p:sp>
         <p:nvSpPr>
-          <p:cNvPr id="151753268" name="Title 1"/>
+          <p:cNvPr id="789988535" name="Title 1"/>
           <p:cNvSpPr>
             <a:spLocks noGrp="1"/>
           </p:cNvSpPr>
@@ -987,7 +987,7 @@
       </p:sp>
       <p:sp>
         <p:nvSpPr>
-          <p:cNvPr id="1572184345" name="Vertical Text Placeholder 2"/>
+          <p:cNvPr id="121896996" name="Vertical Text Placeholder 2"/>
           <p:cNvSpPr>
             <a:spLocks noGrp="1"/>
           </p:cNvSpPr>
@@ -1053,7 +1053,7 @@
       </p:sp>
       <p:sp>
         <p:nvSpPr>
-          <p:cNvPr id="1994512159" name="Date Placeholder 3"/>
+          <p:cNvPr id="1322275500" name="Date Placeholder 3"/>
           <p:cNvSpPr>
             <a:spLocks noGrp="1"/>
           </p:cNvSpPr>
@@ -1079,7 +1079,7 @@
       </p:sp>
       <p:sp>
         <p:nvSpPr>
-          <p:cNvPr id="1266060974" name="Footer Placeholder 4"/>
+          <p:cNvPr id="354323983" name="Footer Placeholder 4"/>
           <p:cNvSpPr>
             <a:spLocks noGrp="1"/>
           </p:cNvSpPr>
@@ -1101,7 +1101,7 @@
       </p:sp>
       <p:sp>
         <p:nvSpPr>
-          <p:cNvPr id="885031952" name="Slide Number Placeholder 5"/>
+          <p:cNvPr id="207453490" name="Slide Number Placeholder 5"/>
           <p:cNvSpPr>
             <a:spLocks noGrp="1"/>
           </p:cNvSpPr>
@@ -1152,7 +1152,7 @@
       </p:grpSpPr>
       <p:sp>
         <p:nvSpPr>
-          <p:cNvPr id="1892712834" name="Vertical Title 1"/>
+          <p:cNvPr id="1750050554" name="Vertical Title 1"/>
           <p:cNvSpPr>
             <a:spLocks noGrp="1"/>
           </p:cNvSpPr>
@@ -1183,7 +1183,7 @@
       </p:sp>
       <p:sp>
         <p:nvSpPr>
-          <p:cNvPr id="741258836" name="Vertical Text Placeholder 2"/>
+          <p:cNvPr id="1813998617" name="Vertical Text Placeholder 2"/>
           <p:cNvSpPr>
             <a:spLocks noGrp="1"/>
           </p:cNvSpPr>
@@ -1254,7 +1254,7 @@
       </p:sp>
       <p:sp>
         <p:nvSpPr>
-          <p:cNvPr id="1258515217" name="Date Placeholder 3"/>
+          <p:cNvPr id="145059292" name="Date Placeholder 3"/>
           <p:cNvSpPr>
             <a:spLocks noGrp="1"/>
           </p:cNvSpPr>
@@ -1280,7 +1280,7 @@
       </p:sp>
       <p:sp>
         <p:nvSpPr>
-          <p:cNvPr id="1490681209" name="Footer Placeholder 4"/>
+          <p:cNvPr id="648550052" name="Footer Placeholder 4"/>
           <p:cNvSpPr>
             <a:spLocks noGrp="1"/>
           </p:cNvSpPr>
@@ -1302,7 +1302,7 @@
       </p:sp>
       <p:sp>
         <p:nvSpPr>
-          <p:cNvPr id="1030091791" name="Slide Number Placeholder 5"/>
+          <p:cNvPr id="1484900802" name="Slide Number Placeholder 5"/>
           <p:cNvSpPr>
             <a:spLocks noGrp="1"/>
           </p:cNvSpPr>
@@ -1353,7 +1353,7 @@
       </p:grpSpPr>
       <p:sp>
         <p:nvSpPr>
-          <p:cNvPr id="642439982" name="Title 1"/>
+          <p:cNvPr id="522579730" name="Title 1"/>
           <p:cNvSpPr>
             <a:spLocks noGrp="1"/>
           </p:cNvSpPr>
@@ -1379,7 +1379,7 @@
       </p:sp>
       <p:sp>
         <p:nvSpPr>
-          <p:cNvPr id="135117422" name="Content Placeholder 2"/>
+          <p:cNvPr id="843773377" name="Content Placeholder 2"/>
           <p:cNvSpPr>
             <a:spLocks noGrp="1"/>
           </p:cNvSpPr>
@@ -1445,7 +1445,7 @@
       </p:sp>
       <p:sp>
         <p:nvSpPr>
-          <p:cNvPr id="1535958756" name="Date Placeholder 3"/>
+          <p:cNvPr id="1358189459" name="Date Placeholder 3"/>
           <p:cNvSpPr>
             <a:spLocks noGrp="1"/>
           </p:cNvSpPr>
@@ -1471,7 +1471,7 @@
       </p:sp>
       <p:sp>
         <p:nvSpPr>
-          <p:cNvPr id="278953106" name="Footer Placeholder 4"/>
+          <p:cNvPr id="280607804" name="Footer Placeholder 4"/>
           <p:cNvSpPr>
             <a:spLocks noGrp="1"/>
           </p:cNvSpPr>
@@ -1493,7 +1493,7 @@
       </p:sp>
       <p:sp>
         <p:nvSpPr>
-          <p:cNvPr id="1624088436" name="Slide Number Placeholder 5"/>
+          <p:cNvPr id="1709051426" name="Slide Number Placeholder 5"/>
           <p:cNvSpPr>
             <a:spLocks noGrp="1"/>
           </p:cNvSpPr>
@@ -1544,7 +1544,7 @@
       </p:grpSpPr>
       <p:sp>
         <p:nvSpPr>
-          <p:cNvPr id="1794917465" name="Title 1"/>
+          <p:cNvPr id="2059147777" name="Title 1"/>
           <p:cNvSpPr>
             <a:spLocks noGrp="1"/>
           </p:cNvSpPr>
@@ -1579,7 +1579,7 @@
       </p:sp>
       <p:sp>
         <p:nvSpPr>
-          <p:cNvPr id="1825555706" name="Text Placeholder 2"/>
+          <p:cNvPr id="24922845" name="Text Placeholder 2"/>
           <p:cNvSpPr>
             <a:spLocks noGrp="1"/>
           </p:cNvSpPr>
@@ -1701,7 +1701,7 @@
       </p:sp>
       <p:sp>
         <p:nvSpPr>
-          <p:cNvPr id="1057363490" name="Date Placeholder 3"/>
+          <p:cNvPr id="932010219" name="Date Placeholder 3"/>
           <p:cNvSpPr>
             <a:spLocks noGrp="1"/>
           </p:cNvSpPr>
@@ -1727,7 +1727,7 @@
       </p:sp>
       <p:sp>
         <p:nvSpPr>
-          <p:cNvPr id="1102437099" name="Footer Placeholder 4"/>
+          <p:cNvPr id="1812064590" name="Footer Placeholder 4"/>
           <p:cNvSpPr>
             <a:spLocks noGrp="1"/>
           </p:cNvSpPr>
@@ -1749,7 +1749,7 @@
       </p:sp>
       <p:sp>
         <p:nvSpPr>
-          <p:cNvPr id="506589698" name="Slide Number Placeholder 5"/>
+          <p:cNvPr id="217735227" name="Slide Number Placeholder 5"/>
           <p:cNvSpPr>
             <a:spLocks noGrp="1"/>
           </p:cNvSpPr>
@@ -1800,7 +1800,7 @@
       </p:grpSpPr>
       <p:sp>
         <p:nvSpPr>
-          <p:cNvPr id="401746524" name="Title 1"/>
+          <p:cNvPr id="323776933" name="Title 1"/>
           <p:cNvSpPr>
             <a:spLocks noGrp="1"/>
           </p:cNvSpPr>
@@ -1826,7 +1826,7 @@
       </p:sp>
       <p:sp>
         <p:nvSpPr>
-          <p:cNvPr id="1118727080" name="Content Placeholder 2"/>
+          <p:cNvPr id="1239071957" name="Content Placeholder 2"/>
           <p:cNvSpPr>
             <a:spLocks noGrp="1"/>
           </p:cNvSpPr>
@@ -1897,7 +1897,7 @@
       </p:sp>
       <p:sp>
         <p:nvSpPr>
-          <p:cNvPr id="293825161" name="Content Placeholder 3"/>
+          <p:cNvPr id="256944409" name="Content Placeholder 3"/>
           <p:cNvSpPr>
             <a:spLocks noGrp="1"/>
           </p:cNvSpPr>
@@ -1968,7 +1968,7 @@
       </p:sp>
       <p:sp>
         <p:nvSpPr>
-          <p:cNvPr id="802373507" name="Date Placeholder 4"/>
+          <p:cNvPr id="868864254" name="Date Placeholder 4"/>
           <p:cNvSpPr>
             <a:spLocks noGrp="1"/>
           </p:cNvSpPr>
@@ -1994,7 +1994,7 @@
       </p:sp>
       <p:sp>
         <p:nvSpPr>
-          <p:cNvPr id="510840825" name="Footer Placeholder 5"/>
+          <p:cNvPr id="423894925" name="Footer Placeholder 5"/>
           <p:cNvSpPr>
             <a:spLocks noGrp="1"/>
           </p:cNvSpPr>
@@ -2016,7 +2016,7 @@
       </p:sp>
       <p:sp>
         <p:nvSpPr>
-          <p:cNvPr id="910293707" name="Slide Number Placeholder 6"/>
+          <p:cNvPr id="476270867" name="Slide Number Placeholder 6"/>
           <p:cNvSpPr>
             <a:spLocks noGrp="1"/>
           </p:cNvSpPr>
@@ -2067,7 +2067,7 @@
       </p:grpSpPr>
       <p:sp>
         <p:nvSpPr>
-          <p:cNvPr id="1688318271" name="Title 1"/>
+          <p:cNvPr id="1339910281" name="Title 1"/>
           <p:cNvSpPr>
             <a:spLocks noGrp="1"/>
           </p:cNvSpPr>
@@ -2098,7 +2098,7 @@
       </p:sp>
       <p:sp>
         <p:nvSpPr>
-          <p:cNvPr id="21259415" name="Text Placeholder 2"/>
+          <p:cNvPr id="1646588043" name="Text Placeholder 2"/>
           <p:cNvSpPr>
             <a:spLocks noGrp="1"/>
           </p:cNvSpPr>
@@ -2166,7 +2166,7 @@
       </p:sp>
       <p:sp>
         <p:nvSpPr>
-          <p:cNvPr id="1285231107" name="Content Placeholder 3"/>
+          <p:cNvPr id="140802725" name="Content Placeholder 3"/>
           <p:cNvSpPr>
             <a:spLocks noGrp="1"/>
           </p:cNvSpPr>
@@ -2237,7 +2237,7 @@
       </p:sp>
       <p:sp>
         <p:nvSpPr>
-          <p:cNvPr id="1495414635" name="Text Placeholder 4"/>
+          <p:cNvPr id="1226757273" name="Text Placeholder 4"/>
           <p:cNvSpPr>
             <a:spLocks noGrp="1"/>
           </p:cNvSpPr>
@@ -2305,7 +2305,7 @@
       </p:sp>
       <p:sp>
         <p:nvSpPr>
-          <p:cNvPr id="640484618" name="Content Placeholder 5"/>
+          <p:cNvPr id="1243716598" name="Content Placeholder 5"/>
           <p:cNvSpPr>
             <a:spLocks noGrp="1"/>
           </p:cNvSpPr>
@@ -2376,7 +2376,7 @@
       </p:sp>
       <p:sp>
         <p:nvSpPr>
-          <p:cNvPr id="1852141221" name="Date Placeholder 6"/>
+          <p:cNvPr id="754089957" name="Date Placeholder 6"/>
           <p:cNvSpPr>
             <a:spLocks noGrp="1"/>
           </p:cNvSpPr>
@@ -2402,7 +2402,7 @@
       </p:sp>
       <p:sp>
         <p:nvSpPr>
-          <p:cNvPr id="342073644" name="Footer Placeholder 7"/>
+          <p:cNvPr id="598523695" name="Footer Placeholder 7"/>
           <p:cNvSpPr>
             <a:spLocks noGrp="1"/>
           </p:cNvSpPr>
@@ -2424,7 +2424,7 @@
       </p:sp>
       <p:sp>
         <p:nvSpPr>
-          <p:cNvPr id="2003405932" name="Slide Number Placeholder 8"/>
+          <p:cNvPr id="1166989177" name="Slide Number Placeholder 8"/>
           <p:cNvSpPr>
             <a:spLocks noGrp="1"/>
           </p:cNvSpPr>
@@ -2475,7 +2475,7 @@
       </p:grpSpPr>
       <p:sp>
         <p:nvSpPr>
-          <p:cNvPr id="2038533649" name="Title 1"/>
+          <p:cNvPr id="1755105163" name="Title 1"/>
           <p:cNvSpPr>
             <a:spLocks noGrp="1"/>
           </p:cNvSpPr>
@@ -2501,7 +2501,7 @@
       </p:sp>
       <p:sp>
         <p:nvSpPr>
-          <p:cNvPr id="429249612" name="Date Placeholder 2"/>
+          <p:cNvPr id="1009723216" name="Date Placeholder 2"/>
           <p:cNvSpPr>
             <a:spLocks noGrp="1"/>
           </p:cNvSpPr>
@@ -2527,7 +2527,7 @@
       </p:sp>
       <p:sp>
         <p:nvSpPr>
-          <p:cNvPr id="1189883384" name="Footer Placeholder 3"/>
+          <p:cNvPr id="781135651" name="Footer Placeholder 3"/>
           <p:cNvSpPr>
             <a:spLocks noGrp="1"/>
           </p:cNvSpPr>
@@ -2549,7 +2549,7 @@
       </p:sp>
       <p:sp>
         <p:nvSpPr>
-          <p:cNvPr id="1336906523" name="Slide Number Placeholder 4"/>
+          <p:cNvPr id="1311152007" name="Slide Number Placeholder 4"/>
           <p:cNvSpPr>
             <a:spLocks noGrp="1"/>
           </p:cNvSpPr>
@@ -2600,7 +2600,7 @@
       </p:grpSpPr>
       <p:sp>
         <p:nvSpPr>
-          <p:cNvPr id="1777766923" name="Date Placeholder 1"/>
+          <p:cNvPr id="1779579603" name="Date Placeholder 1"/>
           <p:cNvSpPr>
             <a:spLocks noGrp="1"/>
           </p:cNvSpPr>
@@ -2626,7 +2626,7 @@
       </p:sp>
       <p:sp>
         <p:nvSpPr>
-          <p:cNvPr id="1340315243" name="Footer Placeholder 2"/>
+          <p:cNvPr id="151499974" name="Footer Placeholder 2"/>
           <p:cNvSpPr>
             <a:spLocks noGrp="1"/>
           </p:cNvSpPr>
@@ -2648,7 +2648,7 @@
       </p:sp>
       <p:sp>
         <p:nvSpPr>
-          <p:cNvPr id="991412646" name="Slide Number Placeholder 3"/>
+          <p:cNvPr id="1775287791" name="Slide Number Placeholder 3"/>
           <p:cNvSpPr>
             <a:spLocks noGrp="1"/>
           </p:cNvSpPr>
@@ -2699,7 +2699,7 @@
       </p:grpSpPr>
       <p:sp>
         <p:nvSpPr>
-          <p:cNvPr id="901180394" name="Title 1"/>
+          <p:cNvPr id="1207910511" name="Title 1"/>
           <p:cNvSpPr>
             <a:spLocks noGrp="1"/>
           </p:cNvSpPr>
@@ -2734,7 +2734,7 @@
       </p:sp>
       <p:sp>
         <p:nvSpPr>
-          <p:cNvPr id="2072798169" name="Content Placeholder 2"/>
+          <p:cNvPr id="1605949673" name="Content Placeholder 2"/>
           <p:cNvSpPr>
             <a:spLocks noGrp="1"/>
           </p:cNvSpPr>
@@ -2833,7 +2833,7 @@
       </p:sp>
       <p:sp>
         <p:nvSpPr>
-          <p:cNvPr id="1432401891" name="Text Placeholder 3"/>
+          <p:cNvPr id="674019328" name="Text Placeholder 3"/>
           <p:cNvSpPr>
             <a:spLocks noGrp="1"/>
           </p:cNvSpPr>
@@ -2901,7 +2901,7 @@
       </p:sp>
       <p:sp>
         <p:nvSpPr>
-          <p:cNvPr id="696100052" name="Date Placeholder 4"/>
+          <p:cNvPr id="691400291" name="Date Placeholder 4"/>
           <p:cNvSpPr>
             <a:spLocks noGrp="1"/>
           </p:cNvSpPr>
@@ -2927,7 +2927,7 @@
       </p:sp>
       <p:sp>
         <p:nvSpPr>
-          <p:cNvPr id="964163742" name="Footer Placeholder 5"/>
+          <p:cNvPr id="361292525" name="Footer Placeholder 5"/>
           <p:cNvSpPr>
             <a:spLocks noGrp="1"/>
           </p:cNvSpPr>
@@ -2949,7 +2949,7 @@
       </p:sp>
       <p:sp>
         <p:nvSpPr>
-          <p:cNvPr id="1981396263" name="Slide Number Placeholder 6"/>
+          <p:cNvPr id="435339843" name="Slide Number Placeholder 6"/>
           <p:cNvSpPr>
             <a:spLocks noGrp="1"/>
           </p:cNvSpPr>
@@ -3000,7 +3000,7 @@
       </p:grpSpPr>
       <p:sp>
         <p:nvSpPr>
-          <p:cNvPr id="1401672" name="Title 1"/>
+          <p:cNvPr id="466732900" name="Title 1"/>
           <p:cNvSpPr>
             <a:spLocks noGrp="1"/>
           </p:cNvSpPr>
@@ -3035,7 +3035,7 @@
       </p:sp>
       <p:sp>
         <p:nvSpPr>
-          <p:cNvPr id="1888879367" name="Picture Placeholder 2"/>
+          <p:cNvPr id="418577699" name="Picture Placeholder 2"/>
           <p:cNvSpPr>
             <a:spLocks noChangeAspect="1" noGrp="1"/>
           </p:cNvSpPr>
@@ -3103,7 +3103,7 @@
       </p:sp>
       <p:sp>
         <p:nvSpPr>
-          <p:cNvPr id="398163465" name="Text Placeholder 3"/>
+          <p:cNvPr id="782595780" name="Text Placeholder 3"/>
           <p:cNvSpPr>
             <a:spLocks noGrp="1"/>
           </p:cNvSpPr>
@@ -3171,7 +3171,7 @@
       </p:sp>
       <p:sp>
         <p:nvSpPr>
-          <p:cNvPr id="943476565" name="Date Placeholder 4"/>
+          <p:cNvPr id="657759862" name="Date Placeholder 4"/>
           <p:cNvSpPr>
             <a:spLocks noGrp="1"/>
           </p:cNvSpPr>
@@ -3197,7 +3197,7 @@
       </p:sp>
       <p:sp>
         <p:nvSpPr>
-          <p:cNvPr id="738563804" name="Footer Placeholder 5"/>
+          <p:cNvPr id="1893470748" name="Footer Placeholder 5"/>
           <p:cNvSpPr>
             <a:spLocks noGrp="1"/>
           </p:cNvSpPr>
@@ -3219,7 +3219,7 @@
       </p:sp>
       <p:sp>
         <p:nvSpPr>
-          <p:cNvPr id="272232228" name="Slide Number Placeholder 6"/>
+          <p:cNvPr id="1479129514" name="Slide Number Placeholder 6"/>
           <p:cNvSpPr>
             <a:spLocks noGrp="1"/>
           </p:cNvSpPr>
@@ -3275,7 +3275,7 @@
       </p:grpSpPr>
       <p:sp>
         <p:nvSpPr>
-          <p:cNvPr id="772578678" name="Title Placeholder 1"/>
+          <p:cNvPr id="292516469" name="Title Placeholder 1"/>
           <p:cNvSpPr>
             <a:spLocks noGrp="1"/>
           </p:cNvSpPr>
@@ -3311,7 +3311,7 @@
       </p:sp>
       <p:sp>
         <p:nvSpPr>
-          <p:cNvPr id="1674769096" name="Text Placeholder 2"/>
+          <p:cNvPr id="179443192" name="Text Placeholder 2"/>
           <p:cNvSpPr>
             <a:spLocks noGrp="1"/>
           </p:cNvSpPr>
@@ -3387,7 +3387,7 @@
       </p:sp>
       <p:sp>
         <p:nvSpPr>
-          <p:cNvPr id="1734993589" name="Date Placeholder 3"/>
+          <p:cNvPr id="12269216" name="Date Placeholder 3"/>
           <p:cNvSpPr>
             <a:spLocks noGrp="1"/>
           </p:cNvSpPr>
@@ -3431,7 +3431,7 @@
       </p:sp>
       <p:sp>
         <p:nvSpPr>
-          <p:cNvPr id="500540143" name="Footer Placeholder 4"/>
+          <p:cNvPr id="1779297453" name="Footer Placeholder 4"/>
           <p:cNvSpPr>
             <a:spLocks noGrp="1"/>
           </p:cNvSpPr>
@@ -3471,7 +3471,7 @@
       </p:sp>
       <p:sp>
         <p:nvSpPr>
-          <p:cNvPr id="679806869" name="Slide Number Placeholder 5"/>
+          <p:cNvPr id="1193649755" name="Slide Number Placeholder 5"/>
           <p:cNvSpPr>
             <a:spLocks noGrp="1"/>
           </p:cNvSpPr>
@@ -3831,7 +3831,7 @@
       </p:grpSpPr>
       <p:sp>
         <p:nvSpPr>
-          <p:cNvPr id="788209663" name="Title 1"/>
+          <p:cNvPr id="2039590279" name="Title 1"/>
           <p:cNvSpPr>
             <a:spLocks noGrp="1"/>
           </p:cNvSpPr>
@@ -3878,7 +3878,7 @@
       </p:sp>
       <p:sp>
         <p:nvSpPr>
-          <p:cNvPr id="1140061264" name="Subtitle 2"/>
+          <p:cNvPr id="2104095975" name="Subtitle 2"/>
           <p:cNvSpPr>
             <a:spLocks noGrp="1"/>
           </p:cNvSpPr>
@@ -3921,7 +3921,7 @@
       </p:sp>
       <p:pic>
         <p:nvPicPr>
-          <p:cNvPr id="69973872" name=""/>
+          <p:cNvPr id="850630865" name=""/>
           <p:cNvPicPr>
             <a:picLocks noChangeAspect="1"/>
           </p:cNvPicPr>
@@ -3976,7 +3976,7 @@
       </p:grpSpPr>
       <p:sp>
         <p:nvSpPr>
-          <p:cNvPr id="113401510" name="Title 1"/>
+          <p:cNvPr id="1999416289" name="Title 1"/>
           <p:cNvSpPr>
             <a:spLocks noGrp="1"/>
           </p:cNvSpPr>
@@ -4010,7 +4010,7 @@
       </p:sp>
       <p:sp>
         <p:nvSpPr>
-          <p:cNvPr id="1128766424" name="Content Placeholder 2"/>
+          <p:cNvPr id="1707770788" name="Content Placeholder 2"/>
           <p:cNvSpPr>
             <a:spLocks noGrp="1"/>
           </p:cNvSpPr>
@@ -4116,7 +4116,7 @@
       </p:grpSpPr>
       <p:sp>
         <p:nvSpPr>
-          <p:cNvPr id="993819487" name="Content Placeholder 2"/>
+          <p:cNvPr id="1111728323" name="Content Placeholder 2"/>
           <p:cNvSpPr>
             <a:spLocks noGrp="1"/>
           </p:cNvSpPr>
@@ -4203,7 +4203,7 @@
       </p:sp>
       <p:sp>
         <p:nvSpPr>
-          <p:cNvPr id="1023772108" name="Title 1"/>
+          <p:cNvPr id="1215842227" name="Title 1"/>
           <p:cNvSpPr>
             <a:spLocks noGrp="1"/>
           </p:cNvSpPr>
@@ -4242,7 +4242,7 @@
       </p:sp>
       <p:pic>
         <p:nvPicPr>
-          <p:cNvPr id="600988972" name=""/>
+          <p:cNvPr id="888833857" name=""/>
           <p:cNvPicPr>
             <a:picLocks noChangeAspect="1"/>
           </p:cNvPicPr>
@@ -4254,8 +4254,8 @@
         </p:blipFill>
         <p:spPr bwMode="auto">
           <a:xfrm>
-            <a:off x="5968999" y="195261"/>
-            <a:ext cx="5438774" cy="6467474"/>
+            <a:off x="6149635" y="266698"/>
+            <a:ext cx="5105399" cy="6324599"/>
           </a:xfrm>
           <a:prstGeom prst="rect">
             <a:avLst/>

</xml_diff>